<commit_message>
Update Generative Image Diffusion.pptx
</commit_message>
<xml_diff>
--- a/Generative Image Diffusion.pptx
+++ b/Generative Image Diffusion.pptx
@@ -6582,8 +6582,91 @@
                   </a:outerShdw>
                 </a:effectLst>
               </a:rPr>
-              <a:t>The resulting</a:t>
-            </a:r>
+              <a:t>The resulting output should be a set of symbols mirroring the originals – to a degree.</a:t>
+            </a:r>
+          </a:p>
+          <a:p>
+            <a:r>
+              <a:rPr lang="en-US" sz="2000" dirty="0">
+                <a:ln w="0"/>
+                <a:solidFill>
+                  <a:schemeClr val="tx1"/>
+                </a:solidFill>
+                <a:effectLst>
+                  <a:outerShdw blurRad="38100" dist="19050" dir="2700000" algn="tl" rotWithShape="0">
+                    <a:schemeClr val="dk1">
+                      <a:alpha val="40000"/>
+                    </a:schemeClr>
+                  </a:outerShdw>
+                </a:effectLst>
+              </a:rPr>
+              <a:t>Due to time constraints, I was limited on time to train the model. It’s taken a day so far to get this running through all of the epochs.</a:t>
+            </a:r>
+          </a:p>
+          <a:p>
+            <a:r>
+              <a:rPr lang="en-US" sz="2000" dirty="0">
+                <a:ln w="0"/>
+                <a:solidFill>
+                  <a:schemeClr val="tx1"/>
+                </a:solidFill>
+                <a:effectLst>
+                  <a:outerShdw blurRad="38100" dist="19050" dir="2700000" algn="tl" rotWithShape="0">
+                    <a:schemeClr val="dk1">
+                      <a:alpha val="40000"/>
+                    </a:schemeClr>
+                  </a:outerShdw>
+                </a:effectLst>
+              </a:rPr>
+              <a:t>That being said, due to the lowered batch size and epoch count I had to give my program due to that time constraint, I estimate that the symbols may not resemble their original counterparts as well as I’d hope.</a:t>
+            </a:r>
+          </a:p>
+          <a:p>
+            <a:r>
+              <a:rPr lang="en-US" sz="2000" dirty="0">
+                <a:ln w="0"/>
+                <a:solidFill>
+                  <a:schemeClr val="tx1"/>
+                </a:solidFill>
+                <a:effectLst>
+                  <a:outerShdw blurRad="38100" dist="19050" dir="2700000" algn="tl" rotWithShape="0">
+                    <a:schemeClr val="dk1">
+                      <a:alpha val="40000"/>
+                    </a:schemeClr>
+                  </a:outerShdw>
+                </a:effectLst>
+              </a:rPr>
+              <a:t>Currently, the program is running smoothly, and I await the results of its generation </a:t>
+            </a:r>
+            <a:r>
+              <a:rPr lang="en-US" sz="2000">
+                <a:ln w="0"/>
+                <a:solidFill>
+                  <a:schemeClr val="tx1"/>
+                </a:solidFill>
+                <a:effectLst>
+                  <a:outerShdw blurRad="38100" dist="19050" dir="2700000" algn="tl" rotWithShape="0">
+                    <a:schemeClr val="dk1">
+                      <a:alpha val="40000"/>
+                    </a:schemeClr>
+                  </a:outerShdw>
+                </a:effectLst>
+              </a:rPr>
+              <a:t>to report them later.</a:t>
+            </a:r>
+            <a:endParaRPr lang="en-US" sz="2000" dirty="0">
+              <a:ln w="0"/>
+              <a:solidFill>
+                <a:schemeClr val="tx1"/>
+              </a:solidFill>
+              <a:effectLst>
+                <a:outerShdw blurRad="38100" dist="19050" dir="2700000" algn="tl" rotWithShape="0">
+                  <a:schemeClr val="dk1">
+                    <a:alpha val="40000"/>
+                  </a:schemeClr>
+                </a:outerShdw>
+              </a:effectLst>
+            </a:endParaRPr>
           </a:p>
         </p:txBody>
       </p:sp>

</xml_diff>

<commit_message>
Getting Rid of Some Junk
</commit_message>
<xml_diff>
--- a/Generative Image Diffusion.pptx
+++ b/Generative Image Diffusion.pptx
@@ -5951,8 +5951,12 @@
           <a:lstStyle/>
           <a:p>
             <a:r>
+              <a:rPr lang="en-US" sz="2400" b="1"/>
+              <a:t>Ethan </a:t>
+            </a:r>
+            <a:r>
               <a:rPr lang="en-US" sz="2400" b="1" dirty="0"/>
-              <a:t>By Ethan Laviolette</a:t>
+              <a:t>Laviolette</a:t>
             </a:r>
           </a:p>
         </p:txBody>
@@ -6710,24 +6714,6 @@
           <a:lstStyle/>
           <a:p>
             <a:r>
-              <a:rPr lang="en-US" sz="6000" b="1" cap="none">
-                <a:ln w="9525">
-                  <a:solidFill>
-                    <a:schemeClr val="bg1"/>
-                  </a:solidFill>
-                  <a:prstDash val="solid"/>
-                </a:ln>
-                <a:effectLst>
-                  <a:outerShdw blurRad="12700" dist="38100" dir="2700000" algn="tl" rotWithShape="0">
-                    <a:schemeClr val="bg1">
-                      <a:lumMod val="50000"/>
-                    </a:schemeClr>
-                  </a:outerShdw>
-                </a:effectLst>
-              </a:rPr>
-              <a:t>	The </a:t>
-            </a:r>
-            <a:r>
               <a:rPr lang="en-US" sz="6000" b="1" cap="none" dirty="0">
                 <a:ln w="9525">
                   <a:solidFill>
@@ -6743,7 +6729,7 @@
                   </a:outerShdw>
                 </a:effectLst>
               </a:rPr>
-              <a:t>Results</a:t>
+              <a:t>	The Results</a:t>
             </a:r>
           </a:p>
         </p:txBody>

</xml_diff>